<commit_message>
Anpassung Klassendiagramme und Präsentation
</commit_message>
<xml_diff>
--- a/doc/task07/unterlagen_task7/Task7.pptx
+++ b/doc/task07/unterlagen_task7/Task7.pptx
@@ -5,18 +5,19 @@
     <p:sldMasterId id="2147483648" r:id="rId1"/>
   </p:sldMasterIdLst>
   <p:notesMasterIdLst>
-    <p:notesMasterId r:id="rId11"/>
+    <p:notesMasterId r:id="rId12"/>
   </p:notesMasterIdLst>
   <p:sldIdLst>
     <p:sldId id="270" r:id="rId2"/>
     <p:sldId id="271" r:id="rId3"/>
     <p:sldId id="272" r:id="rId4"/>
     <p:sldId id="274" r:id="rId5"/>
-    <p:sldId id="273" r:id="rId6"/>
-    <p:sldId id="275" r:id="rId7"/>
-    <p:sldId id="276" r:id="rId8"/>
-    <p:sldId id="277" r:id="rId9"/>
-    <p:sldId id="269" r:id="rId10"/>
+    <p:sldId id="277" r:id="rId6"/>
+    <p:sldId id="273" r:id="rId7"/>
+    <p:sldId id="275" r:id="rId8"/>
+    <p:sldId id="276" r:id="rId9"/>
+    <p:sldId id="278" r:id="rId10"/>
+    <p:sldId id="269" r:id="rId11"/>
   </p:sldIdLst>
   <p:sldSz cx="12192000" cy="6858000"/>
   <p:notesSz cx="6858000" cy="9144000"/>
@@ -117,7 +118,7 @@
   </p:defaultTextStyle>
   <p:extLst>
     <p:ext uri="{EFAFB233-063F-42B5-8137-9DF3F51BA10A}">
-      <p15:sldGuideLst xmlns:p15="http://schemas.microsoft.com/office/powerpoint/2012/main" xmlns="">
+      <p15:sldGuideLst xmlns:p15="http://schemas.microsoft.com/office/powerpoint/2012/main">
         <p15:guide id="1" orient="horz" pos="2160">
           <p15:clr>
             <a:srgbClr val="A4A3A4"/>
@@ -3391,11 +3392,39 @@
           <a:p>
             <a:r>
               <a:rPr lang="de-CH" sz="3200" dirty="0" smtClean="0"/>
-              <a:t>Task 3 – SE </a:t>
+              <a:t>Task </a:t>
+            </a:r>
+            <a:r>
+              <a:rPr lang="de-CH" sz="3200" dirty="0" smtClean="0"/>
+              <a:t>7 </a:t>
+            </a:r>
+            <a:r>
+              <a:rPr lang="de-CH" sz="3200" dirty="0" smtClean="0"/>
+              <a:t>– </a:t>
+            </a:r>
+            <a:r>
+              <a:rPr lang="de-CH" sz="3200" dirty="0" smtClean="0"/>
+              <a:t>Domain Model </a:t>
             </a:r>
             <a:r>
               <a:rPr lang="de-CH" sz="3200" dirty="0" err="1" smtClean="0"/>
-              <a:t>Process</a:t>
+              <a:t>and</a:t>
+            </a:r>
+            <a:r>
+              <a:rPr lang="de-CH" sz="3200" dirty="0" smtClean="0"/>
+              <a:t> </a:t>
+            </a:r>
+            <a:r>
+              <a:rPr lang="de-CH" sz="3200" dirty="0" err="1" smtClean="0"/>
+              <a:t>Sequence</a:t>
+            </a:r>
+            <a:r>
+              <a:rPr lang="de-CH" sz="3200" dirty="0" smtClean="0"/>
+              <a:t> </a:t>
+            </a:r>
+            <a:r>
+              <a:rPr lang="de-CH" sz="3200" dirty="0" err="1" smtClean="0"/>
+              <a:t>Diagram</a:t>
             </a:r>
             <a:endParaRPr lang="de-CH" sz="3200" dirty="0" smtClean="0"/>
           </a:p>
@@ -3458,6 +3487,163 @@
 </p:sld>
 </file>
 
+<file path=ppt/slides/slide10.xml><?xml version="1.0" encoding="utf-8"?>
+<p:sld xmlns:a="http://schemas.openxmlformats.org/drawingml/2006/main" xmlns:r="http://schemas.openxmlformats.org/officeDocument/2006/relationships" xmlns:p="http://schemas.openxmlformats.org/presentationml/2006/main">
+  <p:cSld>
+    <p:spTree>
+      <p:nvGrpSpPr>
+        <p:cNvPr id="1" name=""/>
+        <p:cNvGrpSpPr/>
+        <p:nvPr/>
+      </p:nvGrpSpPr>
+      <p:grpSpPr>
+        <a:xfrm>
+          <a:off x="0" y="0"/>
+          <a:ext cx="0" cy="0"/>
+          <a:chOff x="0" y="0"/>
+          <a:chExt cx="0" cy="0"/>
+        </a:xfrm>
+      </p:grpSpPr>
+      <p:sp>
+        <p:nvSpPr>
+          <p:cNvPr id="2" name="Titel 1"/>
+          <p:cNvSpPr>
+            <a:spLocks noGrp="1"/>
+          </p:cNvSpPr>
+          <p:nvPr>
+            <p:ph type="title"/>
+          </p:nvPr>
+        </p:nvSpPr>
+        <p:spPr/>
+        <p:txBody>
+          <a:bodyPr/>
+          <a:lstStyle/>
+          <a:p>
+            <a:r>
+              <a:rPr lang="de-DE" b="1" dirty="0">
+                <a:solidFill>
+                  <a:srgbClr val="00B050"/>
+                </a:solidFill>
+              </a:rPr>
+              <a:t>7</a:t>
+            </a:r>
+            <a:r>
+              <a:rPr lang="de-DE" b="1" dirty="0" smtClean="0">
+                <a:solidFill>
+                  <a:srgbClr val="00B050"/>
+                </a:solidFill>
+              </a:rPr>
+              <a:t>. </a:t>
+            </a:r>
+            <a:r>
+              <a:rPr lang="de-DE" b="1" dirty="0" err="1" smtClean="0">
+                <a:solidFill>
+                  <a:srgbClr val="00B050"/>
+                </a:solidFill>
+              </a:rPr>
+              <a:t>Discussion</a:t>
+            </a:r>
+            <a:endParaRPr lang="en-GB" dirty="0"/>
+          </a:p>
+        </p:txBody>
+      </p:sp>
+      <p:sp>
+        <p:nvSpPr>
+          <p:cNvPr id="5" name="Inhaltsplatzhalter 2"/>
+          <p:cNvSpPr>
+            <a:spLocks noGrp="1"/>
+          </p:cNvSpPr>
+          <p:nvPr>
+            <p:ph idx="1"/>
+          </p:nvPr>
+        </p:nvSpPr>
+        <p:spPr>
+          <a:xfrm>
+            <a:off x="838200" y="1825624"/>
+            <a:ext cx="9706897" cy="4595495"/>
+          </a:xfrm>
+        </p:spPr>
+        <p:txBody>
+          <a:bodyPr>
+            <a:normAutofit/>
+          </a:bodyPr>
+          <a:lstStyle/>
+          <a:p>
+            <a:r>
+              <a:rPr lang="de-CH" dirty="0" smtClean="0"/>
+              <a:t>Fragen?</a:t>
+            </a:r>
+          </a:p>
+          <a:p>
+            <a:pPr marL="457200" lvl="1" indent="0">
+              <a:buNone/>
+            </a:pPr>
+            <a:endParaRPr lang="de-CH" dirty="0"/>
+          </a:p>
+          <a:p>
+            <a:pPr marL="457200" lvl="1" indent="0">
+              <a:buNone/>
+            </a:pPr>
+            <a:endParaRPr lang="de-CH" dirty="0"/>
+          </a:p>
+          <a:p>
+            <a:pPr marL="0" indent="0">
+              <a:buNone/>
+            </a:pPr>
+            <a:endParaRPr lang="de-CH" dirty="0"/>
+          </a:p>
+        </p:txBody>
+      </p:sp>
+      <p:pic>
+        <p:nvPicPr>
+          <p:cNvPr id="7" name="Grafik 6"/>
+          <p:cNvPicPr>
+            <a:picLocks noChangeAspect="1"/>
+          </p:cNvPicPr>
+          <p:nvPr/>
+        </p:nvPicPr>
+        <p:blipFill>
+          <a:blip r:embed="rId2">
+            <a:extLst>
+              <a:ext uri="{28A0092B-C50C-407E-A947-70E740481C1C}">
+                <a14:useLocalDpi xmlns:a14="http://schemas.microsoft.com/office/drawing/2010/main" val="0"/>
+              </a:ext>
+            </a:extLst>
+          </a:blip>
+          <a:stretch>
+            <a:fillRect/>
+          </a:stretch>
+        </p:blipFill>
+        <p:spPr>
+          <a:xfrm>
+            <a:off x="4126756" y="2238055"/>
+            <a:ext cx="3938488" cy="4318000"/>
+          </a:xfrm>
+          <a:prstGeom prst="rect">
+            <a:avLst/>
+          </a:prstGeom>
+        </p:spPr>
+      </p:pic>
+    </p:spTree>
+    <p:extLst>
+      <p:ext uri="{BB962C8B-B14F-4D97-AF65-F5344CB8AC3E}">
+        <p14:creationId xmlns:p14="http://schemas.microsoft.com/office/powerpoint/2010/main" val="3841519463"/>
+      </p:ext>
+    </p:extLst>
+  </p:cSld>
+  <p:clrMapOvr>
+    <a:masterClrMapping/>
+  </p:clrMapOvr>
+  <p:timing>
+    <p:tnLst>
+      <p:par>
+        <p:cTn id="1" dur="indefinite" restart="never" nodeType="tmRoot"/>
+      </p:par>
+    </p:tnLst>
+  </p:timing>
+</p:sld>
+</file>
+
 <file path=ppt/slides/slide2.xml><?xml version="1.0" encoding="utf-8"?>
 <p:sld xmlns:a="http://schemas.openxmlformats.org/drawingml/2006/main" xmlns:r="http://schemas.openxmlformats.org/officeDocument/2006/relationships" xmlns:p="http://schemas.openxmlformats.org/presentationml/2006/main">
   <p:cSld>
@@ -3528,12 +3714,12 @@
               <a:t>UML </a:t>
             </a:r>
             <a:r>
-              <a:rPr lang="de-CH" dirty="0" err="1" smtClean="0"/>
-              <a:t>class</a:t>
+              <a:rPr lang="de-CH" dirty="0"/>
+              <a:t>C</a:t>
             </a:r>
             <a:r>
               <a:rPr lang="de-CH" dirty="0" smtClean="0"/>
-              <a:t> </a:t>
+              <a:t>lass </a:t>
             </a:r>
             <a:r>
               <a:rPr lang="de-CH" dirty="0" err="1" smtClean="0"/>
@@ -3557,6 +3743,25 @@
             <a:r>
               <a:rPr lang="de-CH" dirty="0" err="1" smtClean="0"/>
               <a:t>diagrams</a:t>
+            </a:r>
+            <a:endParaRPr lang="de-CH" dirty="0" smtClean="0"/>
+          </a:p>
+          <a:p>
+            <a:pPr marL="514350" indent="-514350">
+              <a:buFont typeface="+mj-lt"/>
+              <a:buAutoNum type="arabicPeriod"/>
+            </a:pPr>
+            <a:r>
+              <a:rPr lang="de-CH" dirty="0" err="1" smtClean="0"/>
+              <a:t>Modified</a:t>
+            </a:r>
+            <a:r>
+              <a:rPr lang="de-CH" dirty="0" smtClean="0"/>
+              <a:t> UML Class </a:t>
+            </a:r>
+            <a:r>
+              <a:rPr lang="de-CH" dirty="0" err="1" smtClean="0"/>
+              <a:t>Diagram</a:t>
             </a:r>
             <a:endParaRPr lang="de-CH" dirty="0" smtClean="0"/>
           </a:p>
@@ -3631,15 +3836,15 @@
                   <a:srgbClr val="00B050"/>
                 </a:solidFill>
               </a:rPr>
-              <a:t>1. </a:t>
-            </a:r>
-            <a:r>
-              <a:rPr lang="de-CH" b="1" dirty="0" smtClean="0">
+              <a:t>1. UML </a:t>
+            </a:r>
+            <a:r>
+              <a:rPr lang="de-CH" b="1" dirty="0" err="1">
                 <a:solidFill>
                   <a:srgbClr val="00B050"/>
                 </a:solidFill>
               </a:rPr>
-              <a:t>UML </a:t>
+              <a:t>D</a:t>
             </a:r>
             <a:r>
               <a:rPr lang="de-CH" b="1" dirty="0" err="1" smtClean="0">
@@ -3647,7 +3852,7 @@
                   <a:srgbClr val="00B050"/>
                 </a:solidFill>
               </a:rPr>
-              <a:t>diagrams</a:t>
+              <a:t>iagrams</a:t>
             </a:r>
             <a:r>
               <a:rPr lang="de-CH" b="1" dirty="0" smtClean="0">
@@ -3774,15 +3979,15 @@
                   <a:srgbClr val="00B050"/>
                 </a:solidFill>
               </a:rPr>
-              <a:t>1. </a:t>
-            </a:r>
-            <a:r>
-              <a:rPr lang="de-CH" b="1" dirty="0" smtClean="0">
+              <a:t>1. UML </a:t>
+            </a:r>
+            <a:r>
+              <a:rPr lang="de-CH" b="1" dirty="0" err="1">
                 <a:solidFill>
                   <a:srgbClr val="00B050"/>
                 </a:solidFill>
               </a:rPr>
-              <a:t>UML </a:t>
+              <a:t>D</a:t>
             </a:r>
             <a:r>
               <a:rPr lang="de-CH" b="1" dirty="0" err="1" smtClean="0">
@@ -3790,7 +3995,7 @@
                   <a:srgbClr val="00B050"/>
                 </a:solidFill>
               </a:rPr>
-              <a:t>diagrams</a:t>
+              <a:t>iagrams</a:t>
             </a:r>
             <a:r>
               <a:rPr lang="de-CH" b="1" dirty="0" smtClean="0">
@@ -3810,9 +4015,9 @@
       </p:sp>
       <p:pic>
         <p:nvPicPr>
-          <p:cNvPr id="2050" name="Picture 2" descr="C:\Users\Shpend Vladi\Desktop\JavaProgrammieren\JavaUebungen\ch.bfh.btx8081.w2015.green\doc\task07\unterlagen_task7\uml_domain.png"/>
+          <p:cNvPr id="3" name="Grafik 2"/>
           <p:cNvPicPr>
-            <a:picLocks noChangeAspect="1" noChangeArrowheads="1"/>
+            <a:picLocks noChangeAspect="1"/>
           </p:cNvPicPr>
           <p:nvPr/>
         </p:nvPicPr>
@@ -3824,29 +4029,18 @@
               </a:ext>
             </a:extLst>
           </a:blip>
-          <a:srcRect/>
           <a:stretch>
             <a:fillRect/>
           </a:stretch>
         </p:blipFill>
-        <p:spPr bwMode="auto">
+        <p:spPr>
           <a:xfrm>
-            <a:off x="2203257" y="1399640"/>
-            <a:ext cx="7761139" cy="5265266"/>
+            <a:off x="1622738" y="1461081"/>
+            <a:ext cx="8551571" cy="5725410"/>
           </a:xfrm>
           <a:prstGeom prst="rect">
             <a:avLst/>
           </a:prstGeom>
-          <a:noFill/>
-          <a:extLst>
-            <a:ext uri="{909E8E84-426E-40DD-AFC4-6F175D3DCCD1}">
-              <a14:hiddenFill xmlns:a14="http://schemas.microsoft.com/office/drawing/2010/main">
-                <a:solidFill>
-                  <a:srgbClr val="FFFFFF"/>
-                </a:solidFill>
-              </a14:hiddenFill>
-            </a:ext>
-          </a:extLst>
         </p:spPr>
       </p:pic>
     </p:spTree>
@@ -3907,6 +4101,144 @@
                   <a:srgbClr val="00B050"/>
                 </a:solidFill>
               </a:rPr>
+              <a:t>1. UML </a:t>
+            </a:r>
+            <a:r>
+              <a:rPr lang="de-CH" b="1" dirty="0" err="1">
+                <a:solidFill>
+                  <a:srgbClr val="00B050"/>
+                </a:solidFill>
+              </a:rPr>
+              <a:t>D</a:t>
+            </a:r>
+            <a:r>
+              <a:rPr lang="de-CH" b="1" dirty="0" err="1" smtClean="0">
+                <a:solidFill>
+                  <a:srgbClr val="00B050"/>
+                </a:solidFill>
+              </a:rPr>
+              <a:t>iagrams</a:t>
+            </a:r>
+            <a:r>
+              <a:rPr lang="de-CH" b="1" dirty="0" smtClean="0">
+                <a:solidFill>
+                  <a:srgbClr val="00B050"/>
+                </a:solidFill>
+              </a:rPr>
+              <a:t>: </a:t>
+            </a:r>
+            <a:r>
+              <a:rPr lang="de-CH" b="1" dirty="0" smtClean="0">
+                <a:solidFill>
+                  <a:srgbClr val="00B050"/>
+                </a:solidFill>
+              </a:rPr>
+              <a:t>Aggregation / </a:t>
+            </a:r>
+            <a:r>
+              <a:rPr lang="de-CH" b="1" dirty="0" err="1" smtClean="0">
+                <a:solidFill>
+                  <a:srgbClr val="00B050"/>
+                </a:solidFill>
+              </a:rPr>
+              <a:t>Composition</a:t>
+            </a:r>
+            <a:endParaRPr lang="de-CH" b="1" dirty="0">
+              <a:solidFill>
+                <a:srgbClr val="00B050"/>
+              </a:solidFill>
+            </a:endParaRPr>
+          </a:p>
+        </p:txBody>
+      </p:sp>
+      <p:pic>
+        <p:nvPicPr>
+          <p:cNvPr id="4" name="Grafik 3"/>
+          <p:cNvPicPr>
+            <a:picLocks noChangeAspect="1"/>
+          </p:cNvPicPr>
+          <p:nvPr/>
+        </p:nvPicPr>
+        <p:blipFill>
+          <a:blip r:embed="rId2">
+            <a:extLst>
+              <a:ext uri="{28A0092B-C50C-407E-A947-70E740481C1C}">
+                <a14:useLocalDpi xmlns:a14="http://schemas.microsoft.com/office/drawing/2010/main" val="0"/>
+              </a:ext>
+            </a:extLst>
+          </a:blip>
+          <a:stretch>
+            <a:fillRect/>
+          </a:stretch>
+        </p:blipFill>
+        <p:spPr>
+          <a:xfrm>
+            <a:off x="1957590" y="1305997"/>
+            <a:ext cx="8075052" cy="5921705"/>
+          </a:xfrm>
+          <a:prstGeom prst="rect">
+            <a:avLst/>
+          </a:prstGeom>
+        </p:spPr>
+      </p:pic>
+    </p:spTree>
+    <p:extLst>
+      <p:ext uri="{BB962C8B-B14F-4D97-AF65-F5344CB8AC3E}">
+        <p14:creationId xmlns:p14="http://schemas.microsoft.com/office/powerpoint/2010/main" val="1847732921"/>
+      </p:ext>
+    </p:extLst>
+  </p:cSld>
+  <p:clrMapOvr>
+    <a:masterClrMapping/>
+  </p:clrMapOvr>
+  <p:timing>
+    <p:tnLst>
+      <p:par>
+        <p:cTn id="1" dur="indefinite" restart="never" nodeType="tmRoot"/>
+      </p:par>
+    </p:tnLst>
+  </p:timing>
+</p:sld>
+</file>
+
+<file path=ppt/slides/slide6.xml><?xml version="1.0" encoding="utf-8"?>
+<p:sld xmlns:a="http://schemas.openxmlformats.org/drawingml/2006/main" xmlns:r="http://schemas.openxmlformats.org/officeDocument/2006/relationships" xmlns:p="http://schemas.openxmlformats.org/presentationml/2006/main">
+  <p:cSld>
+    <p:spTree>
+      <p:nvGrpSpPr>
+        <p:cNvPr id="1" name=""/>
+        <p:cNvGrpSpPr/>
+        <p:nvPr/>
+      </p:nvGrpSpPr>
+      <p:grpSpPr>
+        <a:xfrm>
+          <a:off x="0" y="0"/>
+          <a:ext cx="0" cy="0"/>
+          <a:chOff x="0" y="0"/>
+          <a:chExt cx="0" cy="0"/>
+        </a:xfrm>
+      </p:grpSpPr>
+      <p:sp>
+        <p:nvSpPr>
+          <p:cNvPr id="2" name="Titel 1"/>
+          <p:cNvSpPr>
+            <a:spLocks noGrp="1"/>
+          </p:cNvSpPr>
+          <p:nvPr>
+            <p:ph type="title"/>
+          </p:nvPr>
+        </p:nvSpPr>
+        <p:spPr/>
+        <p:txBody>
+          <a:bodyPr/>
+          <a:lstStyle/>
+          <a:p>
+            <a:r>
+              <a:rPr lang="de-CH" b="1" dirty="0" smtClean="0">
+                <a:solidFill>
+                  <a:srgbClr val="00B050"/>
+                </a:solidFill>
+              </a:rPr>
               <a:t>2. </a:t>
             </a:r>
             <a:r>
@@ -3926,12 +4258,20 @@
               <a:t> </a:t>
             </a:r>
             <a:r>
+              <a:rPr lang="de-CH" b="1" dirty="0" err="1">
+                <a:solidFill>
+                  <a:srgbClr val="00B050"/>
+                </a:solidFill>
+              </a:rPr>
+              <a:t>D</a:t>
+            </a:r>
+            <a:r>
               <a:rPr lang="de-CH" b="1" dirty="0" err="1" smtClean="0">
                 <a:solidFill>
                   <a:srgbClr val="00B050"/>
                 </a:solidFill>
               </a:rPr>
-              <a:t>diagrams</a:t>
+              <a:t>iagrams</a:t>
             </a:r>
             <a:r>
               <a:rPr lang="de-CH" b="1" dirty="0" smtClean="0">
@@ -4006,7 +4346,7 @@
 </p:sld>
 </file>
 
-<file path=ppt/slides/slide6.xml><?xml version="1.0" encoding="utf-8"?>
+<file path=ppt/slides/slide7.xml><?xml version="1.0" encoding="utf-8"?>
 <p:sld xmlns:a="http://schemas.openxmlformats.org/drawingml/2006/main" xmlns:r="http://schemas.openxmlformats.org/officeDocument/2006/relationships" xmlns:p="http://schemas.openxmlformats.org/presentationml/2006/main">
   <p:cSld>
     <p:spTree>
@@ -4063,12 +4403,20 @@
               <a:t> </a:t>
             </a:r>
             <a:r>
+              <a:rPr lang="de-CH" b="1" dirty="0" err="1">
+                <a:solidFill>
+                  <a:srgbClr val="00B050"/>
+                </a:solidFill>
+              </a:rPr>
+              <a:t>D</a:t>
+            </a:r>
+            <a:r>
               <a:rPr lang="de-CH" b="1" dirty="0" err="1" smtClean="0">
                 <a:solidFill>
                   <a:srgbClr val="00B050"/>
                 </a:solidFill>
               </a:rPr>
-              <a:t>diagrams</a:t>
+              <a:t>iagrams</a:t>
             </a:r>
             <a:r>
               <a:rPr lang="de-CH" b="1" dirty="0" smtClean="0">
@@ -4143,7 +4491,7 @@
 </p:sld>
 </file>
 
-<file path=ppt/slides/slide7.xml><?xml version="1.0" encoding="utf-8"?>
+<file path=ppt/slides/slide8.xml><?xml version="1.0" encoding="utf-8"?>
 <p:sld xmlns:a="http://schemas.openxmlformats.org/drawingml/2006/main" xmlns:r="http://schemas.openxmlformats.org/officeDocument/2006/relationships" xmlns:p="http://schemas.openxmlformats.org/presentationml/2006/main">
   <p:cSld>
     <p:spTree>
@@ -4200,12 +4548,20 @@
               <a:t> </a:t>
             </a:r>
             <a:r>
+              <a:rPr lang="de-CH" b="1" dirty="0" err="1">
+                <a:solidFill>
+                  <a:srgbClr val="00B050"/>
+                </a:solidFill>
+              </a:rPr>
+              <a:t>D</a:t>
+            </a:r>
+            <a:r>
               <a:rPr lang="de-CH" b="1" dirty="0" err="1" smtClean="0">
                 <a:solidFill>
                   <a:srgbClr val="00B050"/>
                 </a:solidFill>
               </a:rPr>
-              <a:t>diagrams</a:t>
+              <a:t>iagrams</a:t>
             </a:r>
             <a:r>
               <a:rPr lang="de-CH" b="1" dirty="0" smtClean="0">
@@ -4280,143 +4636,6 @@
 </p:sld>
 </file>
 
-<file path=ppt/slides/slide8.xml><?xml version="1.0" encoding="utf-8"?>
-<p:sld xmlns:a="http://schemas.openxmlformats.org/drawingml/2006/main" xmlns:r="http://schemas.openxmlformats.org/officeDocument/2006/relationships" xmlns:p="http://schemas.openxmlformats.org/presentationml/2006/main">
-  <p:cSld>
-    <p:spTree>
-      <p:nvGrpSpPr>
-        <p:cNvPr id="1" name=""/>
-        <p:cNvGrpSpPr/>
-        <p:nvPr/>
-      </p:nvGrpSpPr>
-      <p:grpSpPr>
-        <a:xfrm>
-          <a:off x="0" y="0"/>
-          <a:ext cx="0" cy="0"/>
-          <a:chOff x="0" y="0"/>
-          <a:chExt cx="0" cy="0"/>
-        </a:xfrm>
-      </p:grpSpPr>
-      <p:sp>
-        <p:nvSpPr>
-          <p:cNvPr id="2" name="Titel 1"/>
-          <p:cNvSpPr>
-            <a:spLocks noGrp="1"/>
-          </p:cNvSpPr>
-          <p:nvPr>
-            <p:ph type="title"/>
-          </p:nvPr>
-        </p:nvSpPr>
-        <p:spPr/>
-        <p:txBody>
-          <a:bodyPr/>
-          <a:lstStyle/>
-          <a:p>
-            <a:r>
-              <a:rPr lang="de-CH" b="1" dirty="0" smtClean="0">
-                <a:solidFill>
-                  <a:srgbClr val="00B050"/>
-                </a:solidFill>
-              </a:rPr>
-              <a:t>2. </a:t>
-            </a:r>
-            <a:r>
-              <a:rPr lang="de-CH" b="1" dirty="0" err="1" smtClean="0">
-                <a:solidFill>
-                  <a:srgbClr val="00B050"/>
-                </a:solidFill>
-              </a:rPr>
-              <a:t>Sequence</a:t>
-            </a:r>
-            <a:r>
-              <a:rPr lang="de-CH" b="1" dirty="0" smtClean="0">
-                <a:solidFill>
-                  <a:srgbClr val="00B050"/>
-                </a:solidFill>
-              </a:rPr>
-              <a:t> </a:t>
-            </a:r>
-            <a:r>
-              <a:rPr lang="de-CH" b="1" dirty="0" err="1" smtClean="0">
-                <a:solidFill>
-                  <a:srgbClr val="00B050"/>
-                </a:solidFill>
-              </a:rPr>
-              <a:t>diagrams</a:t>
-            </a:r>
-            <a:r>
-              <a:rPr lang="de-CH" b="1" dirty="0" smtClean="0">
-                <a:solidFill>
-                  <a:srgbClr val="00B050"/>
-                </a:solidFill>
-              </a:rPr>
-              <a:t>: Treatment</a:t>
-            </a:r>
-            <a:endParaRPr lang="de-CH" dirty="0"/>
-          </a:p>
-        </p:txBody>
-      </p:sp>
-      <p:pic>
-        <p:nvPicPr>
-          <p:cNvPr id="6146" name="Picture 2" descr="C:\Users\Shpend Vladi\Desktop\JavaProgrammieren\JavaUebungen\ch.bfh.btx8081.w2015.green\doc\task07\unterlagen_task7\SequenceDiagram_Treatment.jpg"/>
-          <p:cNvPicPr>
-            <a:picLocks noChangeAspect="1" noChangeArrowheads="1"/>
-          </p:cNvPicPr>
-          <p:nvPr/>
-        </p:nvPicPr>
-        <p:blipFill>
-          <a:blip r:embed="rId2">
-            <a:extLst>
-              <a:ext uri="{28A0092B-C50C-407E-A947-70E740481C1C}">
-                <a14:useLocalDpi xmlns:a14="http://schemas.microsoft.com/office/drawing/2010/main" val="0"/>
-              </a:ext>
-            </a:extLst>
-          </a:blip>
-          <a:srcRect/>
-          <a:stretch>
-            <a:fillRect/>
-          </a:stretch>
-        </p:blipFill>
-        <p:spPr bwMode="auto">
-          <a:xfrm>
-            <a:off x="2706035" y="1259719"/>
-            <a:ext cx="6180137" cy="5432425"/>
-          </a:xfrm>
-          <a:prstGeom prst="rect">
-            <a:avLst/>
-          </a:prstGeom>
-          <a:noFill/>
-          <a:extLst>
-            <a:ext uri="{909E8E84-426E-40DD-AFC4-6F175D3DCCD1}">
-              <a14:hiddenFill xmlns:a14="http://schemas.microsoft.com/office/drawing/2010/main">
-                <a:solidFill>
-                  <a:srgbClr val="FFFFFF"/>
-                </a:solidFill>
-              </a14:hiddenFill>
-            </a:ext>
-          </a:extLst>
-        </p:spPr>
-      </p:pic>
-    </p:spTree>
-    <p:extLst>
-      <p:ext uri="{BB962C8B-B14F-4D97-AF65-F5344CB8AC3E}">
-        <p14:creationId xmlns:p14="http://schemas.microsoft.com/office/powerpoint/2010/main" val="2002832510"/>
-      </p:ext>
-    </p:extLst>
-  </p:cSld>
-  <p:clrMapOvr>
-    <a:masterClrMapping/>
-  </p:clrMapOvr>
-  <p:timing>
-    <p:tnLst>
-      <p:par>
-        <p:cTn id="1" dur="indefinite" restart="never" nodeType="tmRoot"/>
-      </p:par>
-    </p:tnLst>
-  </p:timing>
-</p:sld>
-</file>
-
 <file path=ppt/slides/slide9.xml><?xml version="1.0" encoding="utf-8"?>
 <p:sld xmlns:a="http://schemas.openxmlformats.org/drawingml/2006/main" xmlns:r="http://schemas.openxmlformats.org/officeDocument/2006/relationships" xmlns:p="http://schemas.openxmlformats.org/presentationml/2006/main">
   <p:cSld>
@@ -4450,83 +4669,48 @@
           <a:lstStyle/>
           <a:p>
             <a:r>
-              <a:rPr lang="de-DE" b="1" dirty="0">
+              <a:rPr lang="de-CH" b="1" dirty="0" smtClean="0">
                 <a:solidFill>
                   <a:srgbClr val="00B050"/>
                 </a:solidFill>
               </a:rPr>
-              <a:t>7</a:t>
-            </a:r>
-            <a:r>
-              <a:rPr lang="de-DE" b="1" dirty="0" smtClean="0">
+              <a:t>3. </a:t>
+            </a:r>
+            <a:r>
+              <a:rPr lang="de-CH" b="1" dirty="0" err="1" smtClean="0">
                 <a:solidFill>
                   <a:srgbClr val="00B050"/>
                 </a:solidFill>
               </a:rPr>
-              <a:t>. </a:t>
-            </a:r>
-            <a:r>
-              <a:rPr lang="de-DE" b="1" dirty="0" err="1" smtClean="0">
+              <a:t>Modified</a:t>
+            </a:r>
+            <a:r>
+              <a:rPr lang="de-CH" b="1" dirty="0" smtClean="0">
                 <a:solidFill>
                   <a:srgbClr val="00B050"/>
                 </a:solidFill>
               </a:rPr>
-              <a:t>Discussion</a:t>
-            </a:r>
-            <a:endParaRPr lang="en-GB" dirty="0"/>
-          </a:p>
-        </p:txBody>
-      </p:sp>
-      <p:sp>
-        <p:nvSpPr>
-          <p:cNvPr id="5" name="Inhaltsplatzhalter 2"/>
-          <p:cNvSpPr>
-            <a:spLocks noGrp="1"/>
-          </p:cNvSpPr>
-          <p:nvPr>
-            <p:ph idx="1"/>
-          </p:nvPr>
-        </p:nvSpPr>
-        <p:spPr>
-          <a:xfrm>
-            <a:off x="838200" y="1825624"/>
-            <a:ext cx="9706897" cy="4595495"/>
-          </a:xfrm>
-        </p:spPr>
-        <p:txBody>
-          <a:bodyPr>
-            <a:normAutofit/>
-          </a:bodyPr>
-          <a:lstStyle/>
-          <a:p>
-            <a:r>
-              <a:rPr lang="de-CH" dirty="0" smtClean="0"/>
-              <a:t>Fragen?</a:t>
-            </a:r>
-          </a:p>
-          <a:p>
-            <a:pPr marL="457200" lvl="1" indent="0">
-              <a:buNone/>
-            </a:pPr>
-            <a:endParaRPr lang="de-CH" dirty="0"/>
-          </a:p>
-          <a:p>
-            <a:pPr marL="457200" lvl="1" indent="0">
-              <a:buNone/>
-            </a:pPr>
-            <a:endParaRPr lang="de-CH" dirty="0"/>
-          </a:p>
-          <a:p>
-            <a:pPr marL="0" indent="0">
-              <a:buNone/>
-            </a:pPr>
-            <a:endParaRPr lang="de-CH" dirty="0"/>
+              <a:t> UML – Class </a:t>
+            </a:r>
+            <a:r>
+              <a:rPr lang="de-CH" b="1" dirty="0" err="1" smtClean="0">
+                <a:solidFill>
+                  <a:srgbClr val="00B050"/>
+                </a:solidFill>
+              </a:rPr>
+              <a:t>Diagram</a:t>
+            </a:r>
+            <a:endParaRPr lang="de-CH" b="1" dirty="0">
+              <a:solidFill>
+                <a:srgbClr val="00B050"/>
+              </a:solidFill>
+            </a:endParaRPr>
           </a:p>
         </p:txBody>
       </p:sp>
       <p:pic>
         <p:nvPicPr>
-          <p:cNvPr id="7" name="Grafik 6"/>
+          <p:cNvPr id="4" name="Grafik 3"/>
           <p:cNvPicPr>
             <a:picLocks noChangeAspect="1"/>
           </p:cNvPicPr>
@@ -4546,8 +4730,8 @@
         </p:blipFill>
         <p:spPr>
           <a:xfrm>
-            <a:off x="4126756" y="2238055"/>
-            <a:ext cx="3938488" cy="4318000"/>
+            <a:off x="1287887" y="1237090"/>
+            <a:ext cx="9001862" cy="5904245"/>
           </a:xfrm>
           <a:prstGeom prst="rect">
             <a:avLst/>
@@ -4557,7 +4741,7 @@
     </p:spTree>
     <p:extLst>
       <p:ext uri="{BB962C8B-B14F-4D97-AF65-F5344CB8AC3E}">
-        <p14:creationId xmlns:p14="http://schemas.microsoft.com/office/powerpoint/2010/main" val="3841519463"/>
+        <p14:creationId xmlns:p14="http://schemas.microsoft.com/office/powerpoint/2010/main" val="2763292331"/>
       </p:ext>
     </p:extLst>
   </p:cSld>
@@ -4829,7 +5013,7 @@
   <a:extraClrSchemeLst/>
   <a:extLst>
     <a:ext uri="{05A4C25C-085E-4340-85A3-A5531E510DB2}">
-      <thm15:themeFamily xmlns:thm15="http://schemas.microsoft.com/office/thememl/2012/main" xmlns="" name="Office Theme" id="{62F939B6-93AF-4DB8-9C6B-D6C7DFDC589F}" vid="{4A3C46E8-61CC-4603-A589-7422A47A8E4A}"/>
+      <thm15:themeFamily xmlns:thm15="http://schemas.microsoft.com/office/thememl/2012/main" name="Office Theme" id="{62F939B6-93AF-4DB8-9C6B-D6C7DFDC589F}" vid="{4A3C46E8-61CC-4603-A589-7422A47A8E4A}"/>
     </a:ext>
   </a:extLst>
 </a:theme>

</xml_diff>